<commit_message>
Updated workflow table for html/pdf to be optional
</commit_message>
<xml_diff>
--- a/metadata/Fish_Workflow_Tables.pptx
+++ b/metadata/Fish_Workflow_Tables.pptx
@@ -113,12 +113,41 @@
 </p:presentation>
 </file>
 
-<file path=ppt/revisionInfo.xml><?xml version="1.0" encoding="utf-8"?>
-<p1510:revInfo xmlns:a="http://schemas.openxmlformats.org/drawingml/2006/main" xmlns:r="http://schemas.openxmlformats.org/officeDocument/2006/relationships" xmlns:p1510="http://schemas.microsoft.com/office/powerpoint/2015/10/main">
-  <p1510:revLst>
-    <p1510:client id="{43A55E6C-F28B-4968-8520-805C858CAD16}" v="13" dt="2022-06-10T21:11:04.635"/>
-  </p1510:revLst>
-</p1510:revInfo>
+<file path=ppt/changesInfos/changesInfo1.xml><?xml version="1.0" encoding="utf-8"?>
+<pc:chgInfo xmlns:a="http://schemas.openxmlformats.org/drawingml/2006/main" xmlns:r="http://schemas.openxmlformats.org/officeDocument/2006/relationships" xmlns:ac="http://schemas.microsoft.com/office/drawing/2013/main/command" xmlns:pc="http://schemas.microsoft.com/office/powerpoint/2013/main/command">
+  <pc:docChgLst>
+    <pc:chgData name="Pien, Catarina@DWR" userId="5db4c969-fc4f-40b6-b3e1-e51eccd95ace" providerId="ADAL" clId="{8B70DE92-33F9-4BED-9E08-8A88634FDEB4}"/>
+    <pc:docChg chg="undo custSel modSld">
+      <pc:chgData name="Pien, Catarina@DWR" userId="5db4c969-fc4f-40b6-b3e1-e51eccd95ace" providerId="ADAL" clId="{8B70DE92-33F9-4BED-9E08-8A88634FDEB4}" dt="2022-06-13T18:21:02.316" v="16" actId="20577"/>
+      <pc:docMkLst>
+        <pc:docMk/>
+      </pc:docMkLst>
+      <pc:sldChg chg="modSp mod">
+        <pc:chgData name="Pien, Catarina@DWR" userId="5db4c969-fc4f-40b6-b3e1-e51eccd95ace" providerId="ADAL" clId="{8B70DE92-33F9-4BED-9E08-8A88634FDEB4}" dt="2022-06-13T18:21:02.316" v="16" actId="20577"/>
+        <pc:sldMkLst>
+          <pc:docMk/>
+          <pc:sldMk cId="736262757" sldId="259"/>
+        </pc:sldMkLst>
+        <pc:spChg chg="mod">
+          <ac:chgData name="Pien, Catarina@DWR" userId="5db4c969-fc4f-40b6-b3e1-e51eccd95ace" providerId="ADAL" clId="{8B70DE92-33F9-4BED-9E08-8A88634FDEB4}" dt="2022-06-13T18:21:02.316" v="16" actId="20577"/>
+          <ac:spMkLst>
+            <pc:docMk/>
+            <pc:sldMk cId="736262757" sldId="259"/>
+            <ac:spMk id="29" creationId="{789EA3DE-36AF-4E61-AC03-2A07669B4BE6}"/>
+          </ac:spMkLst>
+        </pc:spChg>
+        <pc:spChg chg="mod">
+          <ac:chgData name="Pien, Catarina@DWR" userId="5db4c969-fc4f-40b6-b3e1-e51eccd95ace" providerId="ADAL" clId="{8B70DE92-33F9-4BED-9E08-8A88634FDEB4}" dt="2022-06-13T18:20:57.937" v="13" actId="20577"/>
+          <ac:spMkLst>
+            <pc:docMk/>
+            <pc:sldMk cId="736262757" sldId="259"/>
+            <ac:spMk id="36" creationId="{4322B6BE-8FC8-4727-8E2B-119FB05F857F}"/>
+          </ac:spMkLst>
+        </pc:spChg>
+      </pc:sldChg>
+    </pc:docChg>
+  </pc:docChgLst>
+</pc:chgInfo>
 </file>
 
 <file path=ppt/slideLayouts/slideLayout1.xml><?xml version="1.0" encoding="utf-8"?>
@@ -268,7 +297,7 @@
           <a:p>
             <a:fld id="{C61F7A2E-D841-4ECC-982A-4DE5BA39572F}" type="datetimeFigureOut">
               <a:rPr lang="en-US" smtClean="0"/>
-              <a:t>6/10/2022</a:t>
+              <a:t>6/13/2022</a:t>
             </a:fld>
             <a:endParaRPr lang="en-US"/>
           </a:p>
@@ -466,7 +495,7 @@
           <a:p>
             <a:fld id="{C61F7A2E-D841-4ECC-982A-4DE5BA39572F}" type="datetimeFigureOut">
               <a:rPr lang="en-US" smtClean="0"/>
-              <a:t>6/10/2022</a:t>
+              <a:t>6/13/2022</a:t>
             </a:fld>
             <a:endParaRPr lang="en-US"/>
           </a:p>
@@ -674,7 +703,7 @@
           <a:p>
             <a:fld id="{C61F7A2E-D841-4ECC-982A-4DE5BA39572F}" type="datetimeFigureOut">
               <a:rPr lang="en-US" smtClean="0"/>
-              <a:t>6/10/2022</a:t>
+              <a:t>6/13/2022</a:t>
             </a:fld>
             <a:endParaRPr lang="en-US"/>
           </a:p>
@@ -872,7 +901,7 @@
           <a:p>
             <a:fld id="{C61F7A2E-D841-4ECC-982A-4DE5BA39572F}" type="datetimeFigureOut">
               <a:rPr lang="en-US" smtClean="0"/>
-              <a:t>6/10/2022</a:t>
+              <a:t>6/13/2022</a:t>
             </a:fld>
             <a:endParaRPr lang="en-US"/>
           </a:p>
@@ -1147,7 +1176,7 @@
           <a:p>
             <a:fld id="{C61F7A2E-D841-4ECC-982A-4DE5BA39572F}" type="datetimeFigureOut">
               <a:rPr lang="en-US" smtClean="0"/>
-              <a:t>6/10/2022</a:t>
+              <a:t>6/13/2022</a:t>
             </a:fld>
             <a:endParaRPr lang="en-US"/>
           </a:p>
@@ -1412,7 +1441,7 @@
           <a:p>
             <a:fld id="{C61F7A2E-D841-4ECC-982A-4DE5BA39572F}" type="datetimeFigureOut">
               <a:rPr lang="en-US" smtClean="0"/>
-              <a:t>6/10/2022</a:t>
+              <a:t>6/13/2022</a:t>
             </a:fld>
             <a:endParaRPr lang="en-US"/>
           </a:p>
@@ -1824,7 +1853,7 @@
           <a:p>
             <a:fld id="{C61F7A2E-D841-4ECC-982A-4DE5BA39572F}" type="datetimeFigureOut">
               <a:rPr lang="en-US" smtClean="0"/>
-              <a:t>6/10/2022</a:t>
+              <a:t>6/13/2022</a:t>
             </a:fld>
             <a:endParaRPr lang="en-US"/>
           </a:p>
@@ -1965,7 +1994,7 @@
           <a:p>
             <a:fld id="{C61F7A2E-D841-4ECC-982A-4DE5BA39572F}" type="datetimeFigureOut">
               <a:rPr lang="en-US" smtClean="0"/>
-              <a:t>6/10/2022</a:t>
+              <a:t>6/13/2022</a:t>
             </a:fld>
             <a:endParaRPr lang="en-US"/>
           </a:p>
@@ -2078,7 +2107,7 @@
           <a:p>
             <a:fld id="{C61F7A2E-D841-4ECC-982A-4DE5BA39572F}" type="datetimeFigureOut">
               <a:rPr lang="en-US" smtClean="0"/>
-              <a:t>6/10/2022</a:t>
+              <a:t>6/13/2022</a:t>
             </a:fld>
             <a:endParaRPr lang="en-US"/>
           </a:p>
@@ -2389,7 +2418,7 @@
           <a:p>
             <a:fld id="{C61F7A2E-D841-4ECC-982A-4DE5BA39572F}" type="datetimeFigureOut">
               <a:rPr lang="en-US" smtClean="0"/>
-              <a:t>6/10/2022</a:t>
+              <a:t>6/13/2022</a:t>
             </a:fld>
             <a:endParaRPr lang="en-US"/>
           </a:p>
@@ -2677,7 +2706,7 @@
           <a:p>
             <a:fld id="{C61F7A2E-D841-4ECC-982A-4DE5BA39572F}" type="datetimeFigureOut">
               <a:rPr lang="en-US" smtClean="0"/>
-              <a:t>6/10/2022</a:t>
+              <a:t>6/13/2022</a:t>
             </a:fld>
             <a:endParaRPr lang="en-US"/>
           </a:p>
@@ -2918,7 +2947,7 @@
           <a:p>
             <a:fld id="{C61F7A2E-D841-4ECC-982A-4DE5BA39572F}" type="datetimeFigureOut">
               <a:rPr lang="en-US" smtClean="0"/>
-              <a:t>6/10/2022</a:t>
+              <a:t>6/13/2022</a:t>
             </a:fld>
             <a:endParaRPr lang="en-US"/>
           </a:p>
@@ -4307,8 +4336,13 @@
           <a:p>
             <a:r>
               <a:rPr lang="en-US" sz="1400" b="1" dirty="0"/>
-              <a:t>clean_fish_tables.html</a:t>
+              <a:t>clean_fish_</a:t>
             </a:r>
+            <a:r>
+              <a:rPr lang="en-US" sz="1400" b="1"/>
+              <a:t>tables.pdf</a:t>
+            </a:r>
+            <a:endParaRPr lang="en-US" sz="1400" b="1" dirty="0"/>
           </a:p>
         </p:txBody>
       </p:sp>
@@ -4471,7 +4505,7 @@
             </a:r>
             <a:r>
               <a:rPr lang="en-US" sz="1200" i="1" dirty="0"/>
-              <a:t> output html or pdf</a:t>
+              <a:t> output pdf (optional)</a:t>
             </a:r>
           </a:p>
         </p:txBody>

</xml_diff>